<commit_message>
Try other visualization techniques
</commit_message>
<xml_diff>
--- a/presentations/project_proposal.pptx
+++ b/presentations/project_proposal.pptx
@@ -2,7 +2,7 @@
 <file path=ppt/presentation.xml><?xml version="1.0" encoding="utf-8"?>
 <p:presentation xmlns:a="http://schemas.openxmlformats.org/drawingml/2006/main" xmlns:r="http://schemas.openxmlformats.org/officeDocument/2006/relationships" xmlns:p="http://schemas.openxmlformats.org/presentationml/2006/main" saveSubsetFonts="1">
   <p:sldMasterIdLst>
-    <p:sldMasterId id="2147483660" r:id="rId1"/>
+    <p:sldMasterId id="2147483677" r:id="rId1"/>
   </p:sldMasterIdLst>
   <p:sldIdLst>
     <p:sldId id="256" r:id="rId2"/>
@@ -132,7 +132,7 @@
       </p:grpSpPr>
       <p:grpSp>
         <p:nvGrpSpPr>
-          <p:cNvPr id="7" name="Group 6"/>
+          <p:cNvPr id="8" name="Group 7"/>
           <p:cNvGrpSpPr/>
           <p:nvPr/>
         </p:nvGrpSpPr>
@@ -161,7 +161,8 @@
             <a:ln w="9525">
               <a:solidFill>
                 <a:schemeClr val="bg1">
-                  <a:lumMod val="75000"/>
+                  <a:lumMod val="85000"/>
+                  <a:lumOff val="15000"/>
                 </a:schemeClr>
               </a:solidFill>
             </a:ln>
@@ -199,6 +200,7 @@
               <a:solidFill>
                 <a:schemeClr val="bg1">
                   <a:lumMod val="85000"/>
+                  <a:lumOff val="15000"/>
                 </a:schemeClr>
               </a:solidFill>
             </a:ln>
@@ -886,7 +888,7 @@
     </p:spTree>
     <p:extLst>
       <p:ext uri="{BB962C8B-B14F-4D97-AF65-F5344CB8AC3E}">
-        <p14:creationId xmlns:p14="http://schemas.microsoft.com/office/powerpoint/2010/main" val="2468713606"/>
+        <p14:creationId xmlns:p14="http://schemas.microsoft.com/office/powerpoint/2010/main" val="1376142320"/>
       </p:ext>
     </p:extLst>
   </p:cSld>
@@ -1137,7 +1139,7 @@
     </p:spTree>
     <p:extLst>
       <p:ext uri="{BB962C8B-B14F-4D97-AF65-F5344CB8AC3E}">
-        <p14:creationId xmlns:p14="http://schemas.microsoft.com/office/powerpoint/2010/main" val="3237746530"/>
+        <p14:creationId xmlns:p14="http://schemas.microsoft.com/office/powerpoint/2010/main" val="181348338"/>
       </p:ext>
     </p:extLst>
   </p:cSld>
@@ -1476,10 +1478,7 @@
                   <a:noFill/>
                 </a:ln>
                 <a:solidFill>
-                  <a:schemeClr val="accent1">
-                    <a:lumMod val="60000"/>
-                    <a:lumOff val="40000"/>
-                  </a:schemeClr>
+                  <a:schemeClr val="accent1"/>
                 </a:solidFill>
                 <a:effectLst/>
                 <a:latin typeface="Arial"/>
@@ -1517,31 +1516,20 @@
                   <a:noFill/>
                 </a:ln>
                 <a:solidFill>
-                  <a:schemeClr val="accent1">
-                    <a:lumMod val="60000"/>
-                    <a:lumOff val="40000"/>
-                  </a:schemeClr>
-                </a:solidFill>
+                  <a:schemeClr val="accent1"/>
+                </a:solidFill>
+                <a:effectLst/>
                 <a:latin typeface="Arial"/>
               </a:rPr>
               <a:t>”</a:t>
             </a:r>
-            <a:endParaRPr lang="en-US" dirty="0">
-              <a:solidFill>
-                <a:schemeClr val="accent1">
-                  <a:lumMod val="60000"/>
-                  <a:lumOff val="40000"/>
-                </a:schemeClr>
-              </a:solidFill>
-              <a:latin typeface="Arial"/>
-            </a:endParaRPr>
           </a:p>
         </p:txBody>
       </p:sp>
     </p:spTree>
     <p:extLst>
       <p:ext uri="{BB962C8B-B14F-4D97-AF65-F5344CB8AC3E}">
-        <p14:creationId xmlns:p14="http://schemas.microsoft.com/office/powerpoint/2010/main" val="3442143229"/>
+        <p14:creationId xmlns:p14="http://schemas.microsoft.com/office/powerpoint/2010/main" val="1186532855"/>
       </p:ext>
     </p:extLst>
   </p:cSld>
@@ -1792,7 +1780,7 @@
     </p:spTree>
     <p:extLst>
       <p:ext uri="{BB962C8B-B14F-4D97-AF65-F5344CB8AC3E}">
-        <p14:creationId xmlns:p14="http://schemas.microsoft.com/office/powerpoint/2010/main" val="946599234"/>
+        <p14:creationId xmlns:p14="http://schemas.microsoft.com/office/powerpoint/2010/main" val="3641626359"/>
       </p:ext>
     </p:extLst>
   </p:cSld>
@@ -2131,10 +2119,7 @@
                   <a:noFill/>
                 </a:ln>
                 <a:solidFill>
-                  <a:schemeClr val="accent1">
-                    <a:lumMod val="60000"/>
-                    <a:lumOff val="40000"/>
-                  </a:schemeClr>
+                  <a:schemeClr val="accent1"/>
                 </a:solidFill>
                 <a:effectLst/>
                 <a:latin typeface="Arial"/>
@@ -2172,10 +2157,7 @@
                   <a:noFill/>
                 </a:ln>
                 <a:solidFill>
-                  <a:schemeClr val="accent1">
-                    <a:lumMod val="60000"/>
-                    <a:lumOff val="40000"/>
-                  </a:schemeClr>
+                  <a:schemeClr val="accent1"/>
                 </a:solidFill>
                 <a:effectLst/>
                 <a:latin typeface="Arial"/>
@@ -2188,7 +2170,7 @@
     </p:spTree>
     <p:extLst>
       <p:ext uri="{BB962C8B-B14F-4D97-AF65-F5344CB8AC3E}">
-        <p14:creationId xmlns:p14="http://schemas.microsoft.com/office/powerpoint/2010/main" val="20435537"/>
+        <p14:creationId xmlns:p14="http://schemas.microsoft.com/office/powerpoint/2010/main" val="1557502122"/>
       </p:ext>
     </p:extLst>
   </p:cSld>
@@ -2499,7 +2481,7 @@
     </p:spTree>
     <p:extLst>
       <p:ext uri="{BB962C8B-B14F-4D97-AF65-F5344CB8AC3E}">
-        <p14:creationId xmlns:p14="http://schemas.microsoft.com/office/powerpoint/2010/main" val="3181553277"/>
+        <p14:creationId xmlns:p14="http://schemas.microsoft.com/office/powerpoint/2010/main" val="3233651701"/>
       </p:ext>
     </p:extLst>
   </p:cSld>
@@ -2669,7 +2651,7 @@
     </p:spTree>
     <p:extLst>
       <p:ext uri="{BB962C8B-B14F-4D97-AF65-F5344CB8AC3E}">
-        <p14:creationId xmlns:p14="http://schemas.microsoft.com/office/powerpoint/2010/main" val="1362188817"/>
+        <p14:creationId xmlns:p14="http://schemas.microsoft.com/office/powerpoint/2010/main" val="940017489"/>
       </p:ext>
     </p:extLst>
   </p:cSld>
@@ -2849,7 +2831,7 @@
     </p:spTree>
     <p:extLst>
       <p:ext uri="{BB962C8B-B14F-4D97-AF65-F5344CB8AC3E}">
-        <p14:creationId xmlns:p14="http://schemas.microsoft.com/office/powerpoint/2010/main" val="2803380046"/>
+        <p14:creationId xmlns:p14="http://schemas.microsoft.com/office/powerpoint/2010/main" val="1654274702"/>
       </p:ext>
     </p:extLst>
   </p:cSld>
@@ -3025,7 +3007,7 @@
     </p:spTree>
     <p:extLst>
       <p:ext uri="{BB962C8B-B14F-4D97-AF65-F5344CB8AC3E}">
-        <p14:creationId xmlns:p14="http://schemas.microsoft.com/office/powerpoint/2010/main" val="2286141692"/>
+        <p14:creationId xmlns:p14="http://schemas.microsoft.com/office/powerpoint/2010/main" val="27638599"/>
       </p:ext>
     </p:extLst>
   </p:cSld>
@@ -3272,7 +3254,7 @@
     </p:spTree>
     <p:extLst>
       <p:ext uri="{BB962C8B-B14F-4D97-AF65-F5344CB8AC3E}">
-        <p14:creationId xmlns:p14="http://schemas.microsoft.com/office/powerpoint/2010/main" val="291358090"/>
+        <p14:creationId xmlns:p14="http://schemas.microsoft.com/office/powerpoint/2010/main" val="39172828"/>
       </p:ext>
     </p:extLst>
   </p:cSld>
@@ -3504,7 +3486,7 @@
     </p:spTree>
     <p:extLst>
       <p:ext uri="{BB962C8B-B14F-4D97-AF65-F5344CB8AC3E}">
-        <p14:creationId xmlns:p14="http://schemas.microsoft.com/office/powerpoint/2010/main" val="1740253168"/>
+        <p14:creationId xmlns:p14="http://schemas.microsoft.com/office/powerpoint/2010/main" val="1891514811"/>
       </p:ext>
     </p:extLst>
   </p:cSld>
@@ -3878,7 +3860,7 @@
     </p:spTree>
     <p:extLst>
       <p:ext uri="{BB962C8B-B14F-4D97-AF65-F5344CB8AC3E}">
-        <p14:creationId xmlns:p14="http://schemas.microsoft.com/office/powerpoint/2010/main" val="47117377"/>
+        <p14:creationId xmlns:p14="http://schemas.microsoft.com/office/powerpoint/2010/main" val="1346638678"/>
       </p:ext>
     </p:extLst>
   </p:cSld>
@@ -4001,7 +3983,7 @@
     </p:spTree>
     <p:extLst>
       <p:ext uri="{BB962C8B-B14F-4D97-AF65-F5344CB8AC3E}">
-        <p14:creationId xmlns:p14="http://schemas.microsoft.com/office/powerpoint/2010/main" val="3934976183"/>
+        <p14:creationId xmlns:p14="http://schemas.microsoft.com/office/powerpoint/2010/main" val="3626510493"/>
       </p:ext>
     </p:extLst>
   </p:cSld>
@@ -4096,7 +4078,7 @@
     </p:spTree>
     <p:extLst>
       <p:ext uri="{BB962C8B-B14F-4D97-AF65-F5344CB8AC3E}">
-        <p14:creationId xmlns:p14="http://schemas.microsoft.com/office/powerpoint/2010/main" val="2691929185"/>
+        <p14:creationId xmlns:p14="http://schemas.microsoft.com/office/powerpoint/2010/main" val="2472745733"/>
       </p:ext>
     </p:extLst>
   </p:cSld>
@@ -4351,7 +4333,7 @@
     </p:spTree>
     <p:extLst>
       <p:ext uri="{BB962C8B-B14F-4D97-AF65-F5344CB8AC3E}">
-        <p14:creationId xmlns:p14="http://schemas.microsoft.com/office/powerpoint/2010/main" val="644564344"/>
+        <p14:creationId xmlns:p14="http://schemas.microsoft.com/office/powerpoint/2010/main" val="1805401101"/>
       </p:ext>
     </p:extLst>
   </p:cSld>
@@ -4614,7 +4596,7 @@
     </p:spTree>
     <p:extLst>
       <p:ext uri="{BB962C8B-B14F-4D97-AF65-F5344CB8AC3E}">
-        <p14:creationId xmlns:p14="http://schemas.microsoft.com/office/powerpoint/2010/main" val="2951294667"/>
+        <p14:creationId xmlns:p14="http://schemas.microsoft.com/office/powerpoint/2010/main" val="2935889828"/>
       </p:ext>
     </p:extLst>
   </p:cSld>
@@ -4629,7 +4611,7 @@
   <p:cSld>
     <p:bg>
       <p:bgRef idx="1001">
-        <a:schemeClr val="bg1"/>
+        <a:schemeClr val="bg2"/>
       </p:bgRef>
     </p:bg>
     <p:spTree>
@@ -4648,7 +4630,7 @@
       </p:grpSpPr>
       <p:grpSp>
         <p:nvGrpSpPr>
-          <p:cNvPr id="7" name="Group 6"/>
+          <p:cNvPr id="8" name="Group 7"/>
           <p:cNvGrpSpPr/>
           <p:nvPr/>
         </p:nvGrpSpPr>
@@ -4677,7 +4659,8 @@
             <a:ln w="9525">
               <a:solidFill>
                 <a:schemeClr val="bg1">
-                  <a:lumMod val="75000"/>
+                  <a:lumMod val="85000"/>
+                  <a:lumOff val="15000"/>
                 </a:schemeClr>
               </a:solidFill>
             </a:ln>
@@ -4715,6 +4698,7 @@
               <a:solidFill>
                 <a:schemeClr val="bg1">
                   <a:lumMod val="85000"/>
+                  <a:lumOff val="15000"/>
                 </a:schemeClr>
               </a:solidFill>
             </a:ln>
@@ -5391,28 +5375,28 @@
     </p:spTree>
     <p:extLst>
       <p:ext uri="{BB962C8B-B14F-4D97-AF65-F5344CB8AC3E}">
-        <p14:creationId xmlns:p14="http://schemas.microsoft.com/office/powerpoint/2010/main" val="2844709396"/>
+        <p14:creationId xmlns:p14="http://schemas.microsoft.com/office/powerpoint/2010/main" val="1685248619"/>
       </p:ext>
     </p:extLst>
   </p:cSld>
-  <p:clrMap bg1="lt1" tx1="dk1" bg2="lt2" tx2="dk2" accent1="accent1" accent2="accent2" accent3="accent3" accent4="accent4" accent5="accent5" accent6="accent6" hlink="hlink" folHlink="folHlink"/>
+  <p:clrMap bg1="dk1" tx1="lt1" bg2="dk2" tx2="lt2" accent1="accent1" accent2="accent2" accent3="accent3" accent4="accent4" accent5="accent5" accent6="accent6" hlink="hlink" folHlink="folHlink"/>
   <p:sldLayoutIdLst>
-    <p:sldLayoutId id="2147483661" r:id="rId1"/>
-    <p:sldLayoutId id="2147483662" r:id="rId2"/>
-    <p:sldLayoutId id="2147483663" r:id="rId3"/>
-    <p:sldLayoutId id="2147483664" r:id="rId4"/>
-    <p:sldLayoutId id="2147483665" r:id="rId5"/>
-    <p:sldLayoutId id="2147483666" r:id="rId6"/>
-    <p:sldLayoutId id="2147483667" r:id="rId7"/>
-    <p:sldLayoutId id="2147483668" r:id="rId8"/>
-    <p:sldLayoutId id="2147483669" r:id="rId9"/>
-    <p:sldLayoutId id="2147483670" r:id="rId10"/>
-    <p:sldLayoutId id="2147483671" r:id="rId11"/>
-    <p:sldLayoutId id="2147483672" r:id="rId12"/>
-    <p:sldLayoutId id="2147483673" r:id="rId13"/>
-    <p:sldLayoutId id="2147483674" r:id="rId14"/>
-    <p:sldLayoutId id="2147483675" r:id="rId15"/>
-    <p:sldLayoutId id="2147483676" r:id="rId16"/>
+    <p:sldLayoutId id="2147483678" r:id="rId1"/>
+    <p:sldLayoutId id="2147483679" r:id="rId2"/>
+    <p:sldLayoutId id="2147483680" r:id="rId3"/>
+    <p:sldLayoutId id="2147483681" r:id="rId4"/>
+    <p:sldLayoutId id="2147483682" r:id="rId5"/>
+    <p:sldLayoutId id="2147483683" r:id="rId6"/>
+    <p:sldLayoutId id="2147483684" r:id="rId7"/>
+    <p:sldLayoutId id="2147483685" r:id="rId8"/>
+    <p:sldLayoutId id="2147483686" r:id="rId9"/>
+    <p:sldLayoutId id="2147483687" r:id="rId10"/>
+    <p:sldLayoutId id="2147483688" r:id="rId11"/>
+    <p:sldLayoutId id="2147483689" r:id="rId12"/>
+    <p:sldLayoutId id="2147483690" r:id="rId13"/>
+    <p:sldLayoutId id="2147483691" r:id="rId14"/>
+    <p:sldLayoutId id="2147483692" r:id="rId15"/>
+    <p:sldLayoutId id="2147483693" r:id="rId16"/>
   </p:sldLayoutIdLst>
   <p:txStyles>
     <p:titleStyle>
@@ -5881,7 +5865,7 @@
           <a:p>
             <a:r>
               <a:rPr lang="sv-SE" dirty="0"/>
-              <a:t>Project Proposal</a:t>
+              <a:t>Homework 3 - Project Proposal</a:t>
             </a:r>
           </a:p>
           <a:p>
@@ -5927,759 +5911,6 @@
           <a:chExt cx="0" cy="0"/>
         </a:xfrm>
       </p:grpSpPr>
-      <p:sp useBgFill="1">
-        <p:nvSpPr>
-          <p:cNvPr id="8" name="Rectangle 7">
-            <a:extLst>
-              <a:ext uri="{FF2B5EF4-FFF2-40B4-BE49-F238E27FC236}">
-                <a16:creationId xmlns:a16="http://schemas.microsoft.com/office/drawing/2014/main" id="{86C16C40-7C29-4ACC-B851-7E08E459B596}"/>
-              </a:ext>
-              <a:ext uri="{C183D7F6-B498-43B3-948B-1728B52AA6E4}">
-                <adec:decorative xmlns:adec="http://schemas.microsoft.com/office/drawing/2017/decorative" val="1"/>
-              </a:ext>
-            </a:extLst>
-          </p:cNvPr>
-          <p:cNvSpPr>
-            <a:spLocks noGrp="1" noRot="1" noChangeAspect="1" noMove="1" noResize="1" noEditPoints="1" noAdjustHandles="1" noChangeArrowheads="1" noChangeShapeType="1" noTextEdit="1"/>
-          </p:cNvSpPr>
-          <p:nvPr>
-            <p:extLst>
-              <p:ext uri="{386F3935-93C4-4BCD-93E2-E3B085C9AB24}">
-                <p16:designElem xmlns:p16="http://schemas.microsoft.com/office/powerpoint/2015/main" val="1"/>
-              </p:ext>
-            </p:extLst>
-          </p:nvPr>
-        </p:nvSpPr>
-        <p:spPr>
-          <a:xfrm>
-            <a:off x="0" y="0"/>
-            <a:ext cx="12192000" cy="6858000"/>
-          </a:xfrm>
-          <a:prstGeom prst="rect">
-            <a:avLst/>
-          </a:prstGeom>
-          <a:ln>
-            <a:noFill/>
-          </a:ln>
-        </p:spPr>
-        <p:style>
-          <a:lnRef idx="2">
-            <a:schemeClr val="accent1">
-              <a:shade val="50000"/>
-            </a:schemeClr>
-          </a:lnRef>
-          <a:fillRef idx="1">
-            <a:schemeClr val="accent1"/>
-          </a:fillRef>
-          <a:effectRef idx="0">
-            <a:schemeClr val="accent1"/>
-          </a:effectRef>
-          <a:fontRef idx="minor">
-            <a:schemeClr val="lt1"/>
-          </a:fontRef>
-        </p:style>
-        <p:txBody>
-          <a:bodyPr rtlCol="0" anchor="ctr"/>
-          <a:lstStyle/>
-          <a:p>
-            <a:pPr algn="ctr"/>
-            <a:endParaRPr lang="en-US"/>
-          </a:p>
-        </p:txBody>
-      </p:sp>
-      <p:grpSp>
-        <p:nvGrpSpPr>
-          <p:cNvPr id="10" name="Group 9">
-            <a:extLst>
-              <a:ext uri="{FF2B5EF4-FFF2-40B4-BE49-F238E27FC236}">
-                <a16:creationId xmlns:a16="http://schemas.microsoft.com/office/drawing/2014/main" id="{CDD733AE-DD5E-4C77-8BCD-72BF12A06BB1}"/>
-              </a:ext>
-              <a:ext uri="{C183D7F6-B498-43B3-948B-1728B52AA6E4}">
-                <adec:decorative xmlns:adec="http://schemas.microsoft.com/office/drawing/2017/decorative" val="1"/>
-              </a:ext>
-            </a:extLst>
-          </p:cNvPr>
-          <p:cNvGrpSpPr>
-            <a:grpSpLocks noGrp="1" noUngrp="1" noRot="1" noChangeAspect="1" noMove="1" noResize="1"/>
-          </p:cNvGrpSpPr>
-          <p:nvPr>
-            <p:extLst>
-              <p:ext uri="{386F3935-93C4-4BCD-93E2-E3B085C9AB24}">
-                <p16:designElem xmlns:p16="http://schemas.microsoft.com/office/powerpoint/2015/main" val="1"/>
-              </p:ext>
-            </p:extLst>
-          </p:nvPr>
-        </p:nvGrpSpPr>
-        <p:grpSpPr>
-          <a:xfrm>
-            <a:off x="0" y="-8467"/>
-            <a:ext cx="12192000" cy="6866467"/>
-            <a:chOff x="0" y="-8467"/>
-            <a:chExt cx="12192000" cy="6866467"/>
-          </a:xfrm>
-        </p:grpSpPr>
-        <p:cxnSp>
-          <p:nvCxnSpPr>
-            <p:cNvPr id="11" name="Straight Connector 10">
-              <a:extLst>
-                <a:ext uri="{FF2B5EF4-FFF2-40B4-BE49-F238E27FC236}">
-                  <a16:creationId xmlns:a16="http://schemas.microsoft.com/office/drawing/2014/main" id="{51DE90A4-932E-4370-BA07-30F43254C01B}"/>
-                </a:ext>
-                <a:ext uri="{C183D7F6-B498-43B3-948B-1728B52AA6E4}">
-                  <adec:decorative xmlns:adec="http://schemas.microsoft.com/office/drawing/2017/decorative" val="1"/>
-                </a:ext>
-              </a:extLst>
-            </p:cNvPr>
-            <p:cNvCxnSpPr/>
-            <p:nvPr>
-              <p:extLst>
-                <p:ext uri="{386F3935-93C4-4BCD-93E2-E3B085C9AB24}">
-                  <p16:designElem xmlns:p16="http://schemas.microsoft.com/office/powerpoint/2015/main" val="1"/>
-                </p:ext>
-              </p:extLst>
-            </p:nvPr>
-          </p:nvCxnSpPr>
-          <p:spPr>
-            <a:xfrm>
-              <a:off x="9371012" y="0"/>
-              <a:ext cx="1219200" cy="6858000"/>
-            </a:xfrm>
-            <a:prstGeom prst="line">
-              <a:avLst/>
-            </a:prstGeom>
-            <a:ln w="9525">
-              <a:solidFill>
-                <a:srgbClr val="FFFFFF"/>
-              </a:solidFill>
-            </a:ln>
-          </p:spPr>
-          <p:style>
-            <a:lnRef idx="2">
-              <a:schemeClr val="accent1"/>
-            </a:lnRef>
-            <a:fillRef idx="0">
-              <a:schemeClr val="accent1"/>
-            </a:fillRef>
-            <a:effectRef idx="1">
-              <a:schemeClr val="accent1"/>
-            </a:effectRef>
-            <a:fontRef idx="minor">
-              <a:schemeClr val="tx1"/>
-            </a:fontRef>
-          </p:style>
-        </p:cxnSp>
-        <p:cxnSp>
-          <p:nvCxnSpPr>
-            <p:cNvPr id="12" name="Straight Connector 11">
-              <a:extLst>
-                <a:ext uri="{FF2B5EF4-FFF2-40B4-BE49-F238E27FC236}">
-                  <a16:creationId xmlns:a16="http://schemas.microsoft.com/office/drawing/2014/main" id="{6A19CA4A-B208-452A-8BE4-BC6940D33D40}"/>
-                </a:ext>
-                <a:ext uri="{C183D7F6-B498-43B3-948B-1728B52AA6E4}">
-                  <adec:decorative xmlns:adec="http://schemas.microsoft.com/office/drawing/2017/decorative" val="1"/>
-                </a:ext>
-              </a:extLst>
-            </p:cNvPr>
-            <p:cNvCxnSpPr/>
-            <p:nvPr>
-              <p:extLst>
-                <p:ext uri="{386F3935-93C4-4BCD-93E2-E3B085C9AB24}">
-                  <p16:designElem xmlns:p16="http://schemas.microsoft.com/office/powerpoint/2015/main" val="1"/>
-                </p:ext>
-              </p:extLst>
-            </p:nvPr>
-          </p:nvCxnSpPr>
-          <p:spPr>
-            <a:xfrm flipH="1">
-              <a:off x="7425267" y="3681413"/>
-              <a:ext cx="4763558" cy="3176587"/>
-            </a:xfrm>
-            <a:prstGeom prst="line">
-              <a:avLst/>
-            </a:prstGeom>
-            <a:ln w="9525">
-              <a:solidFill>
-                <a:srgbClr val="FFFFFF"/>
-              </a:solidFill>
-            </a:ln>
-          </p:spPr>
-          <p:style>
-            <a:lnRef idx="2">
-              <a:schemeClr val="accent1"/>
-            </a:lnRef>
-            <a:fillRef idx="0">
-              <a:schemeClr val="accent1"/>
-            </a:fillRef>
-            <a:effectRef idx="1">
-              <a:schemeClr val="accent1"/>
-            </a:effectRef>
-            <a:fontRef idx="minor">
-              <a:schemeClr val="tx1"/>
-            </a:fontRef>
-          </p:style>
-        </p:cxnSp>
-        <p:sp>
-          <p:nvSpPr>
-            <p:cNvPr id="13" name="Rectangle 23">
-              <a:extLst>
-                <a:ext uri="{FF2B5EF4-FFF2-40B4-BE49-F238E27FC236}">
-                  <a16:creationId xmlns:a16="http://schemas.microsoft.com/office/drawing/2014/main" id="{B74F8D3E-E618-4DE3-A0CC-B4904BB5D5AB}"/>
-                </a:ext>
-                <a:ext uri="{C183D7F6-B498-43B3-948B-1728B52AA6E4}">
-                  <adec:decorative xmlns:adec="http://schemas.microsoft.com/office/drawing/2017/decorative" val="1"/>
-                </a:ext>
-              </a:extLst>
-            </p:cNvPr>
-            <p:cNvSpPr/>
-            <p:nvPr>
-              <p:extLst>
-                <p:ext uri="{386F3935-93C4-4BCD-93E2-E3B085C9AB24}">
-                  <p16:designElem xmlns:p16="http://schemas.microsoft.com/office/powerpoint/2015/main" val="1"/>
-                </p:ext>
-              </p:extLst>
-            </p:nvPr>
-          </p:nvSpPr>
-          <p:spPr>
-            <a:xfrm>
-              <a:off x="9181476" y="-8467"/>
-              <a:ext cx="3007349" cy="6866467"/>
-            </a:xfrm>
-            <a:custGeom>
-              <a:avLst/>
-              <a:gdLst/>
-              <a:ahLst/>
-              <a:cxnLst/>
-              <a:rect l="l" t="t" r="r" b="b"/>
-              <a:pathLst>
-                <a:path w="3007349" h="6866467">
-                  <a:moveTo>
-                    <a:pt x="2045532" y="0"/>
-                  </a:moveTo>
-                  <a:lnTo>
-                    <a:pt x="3007349" y="0"/>
-                  </a:lnTo>
-                  <a:lnTo>
-                    <a:pt x="3007349" y="6866467"/>
-                  </a:lnTo>
-                  <a:lnTo>
-                    <a:pt x="0" y="6866467"/>
-                  </a:lnTo>
-                  <a:lnTo>
-                    <a:pt x="2045532" y="0"/>
-                  </a:lnTo>
-                  <a:close/>
-                </a:path>
-              </a:pathLst>
-            </a:custGeom>
-            <a:solidFill>
-              <a:schemeClr val="accent1">
-                <a:alpha val="30000"/>
-              </a:schemeClr>
-            </a:solidFill>
-            <a:ln>
-              <a:noFill/>
-            </a:ln>
-            <a:effectLst/>
-          </p:spPr>
-          <p:style>
-            <a:lnRef idx="1">
-              <a:schemeClr val="accent1"/>
-            </a:lnRef>
-            <a:fillRef idx="3">
-              <a:schemeClr val="accent1"/>
-            </a:fillRef>
-            <a:effectRef idx="2">
-              <a:schemeClr val="accent1"/>
-            </a:effectRef>
-            <a:fontRef idx="minor">
-              <a:schemeClr val="lt1"/>
-            </a:fontRef>
-          </p:style>
-        </p:sp>
-        <p:sp>
-          <p:nvSpPr>
-            <p:cNvPr id="14" name="Rectangle 25">
-              <a:extLst>
-                <a:ext uri="{FF2B5EF4-FFF2-40B4-BE49-F238E27FC236}">
-                  <a16:creationId xmlns:a16="http://schemas.microsoft.com/office/drawing/2014/main" id="{299DA406-C54B-4E31-867D-FAF8DCE7045F}"/>
-                </a:ext>
-                <a:ext uri="{C183D7F6-B498-43B3-948B-1728B52AA6E4}">
-                  <adec:decorative xmlns:adec="http://schemas.microsoft.com/office/drawing/2017/decorative" val="1"/>
-                </a:ext>
-              </a:extLst>
-            </p:cNvPr>
-            <p:cNvSpPr/>
-            <p:nvPr>
-              <p:extLst>
-                <p:ext uri="{386F3935-93C4-4BCD-93E2-E3B085C9AB24}">
-                  <p16:designElem xmlns:p16="http://schemas.microsoft.com/office/powerpoint/2015/main" val="1"/>
-                </p:ext>
-              </p:extLst>
-            </p:nvPr>
-          </p:nvSpPr>
-          <p:spPr>
-            <a:xfrm>
-              <a:off x="9603442" y="-8467"/>
-              <a:ext cx="2588558" cy="6866467"/>
-            </a:xfrm>
-            <a:custGeom>
-              <a:avLst/>
-              <a:gdLst/>
-              <a:ahLst/>
-              <a:cxnLst/>
-              <a:rect l="l" t="t" r="r" b="b"/>
-              <a:pathLst>
-                <a:path w="2573311" h="6866467">
-                  <a:moveTo>
-                    <a:pt x="0" y="0"/>
-                  </a:moveTo>
-                  <a:lnTo>
-                    <a:pt x="2573311" y="0"/>
-                  </a:lnTo>
-                  <a:lnTo>
-                    <a:pt x="2573311" y="6866467"/>
-                  </a:lnTo>
-                  <a:lnTo>
-                    <a:pt x="1202336" y="6866467"/>
-                  </a:lnTo>
-                  <a:lnTo>
-                    <a:pt x="0" y="0"/>
-                  </a:lnTo>
-                  <a:close/>
-                </a:path>
-              </a:pathLst>
-            </a:custGeom>
-            <a:solidFill>
-              <a:schemeClr val="accent1">
-                <a:alpha val="20000"/>
-              </a:schemeClr>
-            </a:solidFill>
-            <a:ln>
-              <a:noFill/>
-            </a:ln>
-            <a:effectLst/>
-          </p:spPr>
-          <p:style>
-            <a:lnRef idx="1">
-              <a:schemeClr val="accent1"/>
-            </a:lnRef>
-            <a:fillRef idx="3">
-              <a:schemeClr val="accent1"/>
-            </a:fillRef>
-            <a:effectRef idx="2">
-              <a:schemeClr val="accent1"/>
-            </a:effectRef>
-            <a:fontRef idx="minor">
-              <a:schemeClr val="lt1"/>
-            </a:fontRef>
-          </p:style>
-        </p:sp>
-        <p:sp>
-          <p:nvSpPr>
-            <p:cNvPr id="15" name="Isosceles Triangle 14">
-              <a:extLst>
-                <a:ext uri="{FF2B5EF4-FFF2-40B4-BE49-F238E27FC236}">
-                  <a16:creationId xmlns:a16="http://schemas.microsoft.com/office/drawing/2014/main" id="{A1E16883-5140-47C4-A9AD-AD6598AC3EE6}"/>
-                </a:ext>
-                <a:ext uri="{C183D7F6-B498-43B3-948B-1728B52AA6E4}">
-                  <adec:decorative xmlns:adec="http://schemas.microsoft.com/office/drawing/2017/decorative" val="1"/>
-                </a:ext>
-              </a:extLst>
-            </p:cNvPr>
-            <p:cNvSpPr/>
-            <p:nvPr>
-              <p:extLst>
-                <p:ext uri="{386F3935-93C4-4BCD-93E2-E3B085C9AB24}">
-                  <p16:designElem xmlns:p16="http://schemas.microsoft.com/office/powerpoint/2015/main" val="1"/>
-                </p:ext>
-              </p:extLst>
-            </p:nvPr>
-          </p:nvSpPr>
-          <p:spPr>
-            <a:xfrm>
-              <a:off x="8932333" y="3048000"/>
-              <a:ext cx="3259667" cy="3810000"/>
-            </a:xfrm>
-            <a:prstGeom prst="triangle">
-              <a:avLst>
-                <a:gd name="adj" fmla="val 100000"/>
-              </a:avLst>
-            </a:prstGeom>
-            <a:solidFill>
-              <a:schemeClr val="accent2">
-                <a:alpha val="72000"/>
-              </a:schemeClr>
-            </a:solidFill>
-            <a:ln>
-              <a:noFill/>
-            </a:ln>
-            <a:effectLst/>
-          </p:spPr>
-          <p:style>
-            <a:lnRef idx="1">
-              <a:schemeClr val="accent1"/>
-            </a:lnRef>
-            <a:fillRef idx="3">
-              <a:schemeClr val="accent1"/>
-            </a:fillRef>
-            <a:effectRef idx="2">
-              <a:schemeClr val="accent1"/>
-            </a:effectRef>
-            <a:fontRef idx="minor">
-              <a:schemeClr val="lt1"/>
-            </a:fontRef>
-          </p:style>
-        </p:sp>
-        <p:sp>
-          <p:nvSpPr>
-            <p:cNvPr id="16" name="Rectangle 27">
-              <a:extLst>
-                <a:ext uri="{FF2B5EF4-FFF2-40B4-BE49-F238E27FC236}">
-                  <a16:creationId xmlns:a16="http://schemas.microsoft.com/office/drawing/2014/main" id="{4CD848DC-8A2A-4093-9BDD-7AF4B6A27814}"/>
-                </a:ext>
-                <a:ext uri="{C183D7F6-B498-43B3-948B-1728B52AA6E4}">
-                  <adec:decorative xmlns:adec="http://schemas.microsoft.com/office/drawing/2017/decorative" val="1"/>
-                </a:ext>
-              </a:extLst>
-            </p:cNvPr>
-            <p:cNvSpPr/>
-            <p:nvPr>
-              <p:extLst>
-                <p:ext uri="{386F3935-93C4-4BCD-93E2-E3B085C9AB24}">
-                  <p16:designElem xmlns:p16="http://schemas.microsoft.com/office/powerpoint/2015/main" val="1"/>
-                </p:ext>
-              </p:extLst>
-            </p:nvPr>
-          </p:nvSpPr>
-          <p:spPr>
-            <a:xfrm>
-              <a:off x="9334500" y="-8467"/>
-              <a:ext cx="2854326" cy="6866467"/>
-            </a:xfrm>
-            <a:custGeom>
-              <a:avLst/>
-              <a:gdLst/>
-              <a:ahLst/>
-              <a:cxnLst/>
-              <a:rect l="l" t="t" r="r" b="b"/>
-              <a:pathLst>
-                <a:path w="2858013" h="6866467">
-                  <a:moveTo>
-                    <a:pt x="0" y="0"/>
-                  </a:moveTo>
-                  <a:lnTo>
-                    <a:pt x="2858013" y="0"/>
-                  </a:lnTo>
-                  <a:lnTo>
-                    <a:pt x="2858013" y="6866467"/>
-                  </a:lnTo>
-                  <a:lnTo>
-                    <a:pt x="2473942" y="6866467"/>
-                  </a:lnTo>
-                  <a:lnTo>
-                    <a:pt x="0" y="0"/>
-                  </a:lnTo>
-                  <a:close/>
-                </a:path>
-              </a:pathLst>
-            </a:custGeom>
-            <a:solidFill>
-              <a:schemeClr val="accent2">
-                <a:lumMod val="75000"/>
-                <a:alpha val="70000"/>
-              </a:schemeClr>
-            </a:solidFill>
-            <a:ln>
-              <a:noFill/>
-            </a:ln>
-            <a:effectLst/>
-          </p:spPr>
-          <p:style>
-            <a:lnRef idx="1">
-              <a:schemeClr val="accent1"/>
-            </a:lnRef>
-            <a:fillRef idx="3">
-              <a:schemeClr val="accent1"/>
-            </a:fillRef>
-            <a:effectRef idx="2">
-              <a:schemeClr val="accent1"/>
-            </a:effectRef>
-            <a:fontRef idx="minor">
-              <a:schemeClr val="lt1"/>
-            </a:fontRef>
-          </p:style>
-        </p:sp>
-        <p:sp>
-          <p:nvSpPr>
-            <p:cNvPr id="17" name="Rectangle 28">
-              <a:extLst>
-                <a:ext uri="{FF2B5EF4-FFF2-40B4-BE49-F238E27FC236}">
-                  <a16:creationId xmlns:a16="http://schemas.microsoft.com/office/drawing/2014/main" id="{34635A4D-E9CE-4B78-912A-479EA4512B14}"/>
-                </a:ext>
-                <a:ext uri="{C183D7F6-B498-43B3-948B-1728B52AA6E4}">
-                  <adec:decorative xmlns:adec="http://schemas.microsoft.com/office/drawing/2017/decorative" val="1"/>
-                </a:ext>
-              </a:extLst>
-            </p:cNvPr>
-            <p:cNvSpPr/>
-            <p:nvPr>
-              <p:extLst>
-                <p:ext uri="{386F3935-93C4-4BCD-93E2-E3B085C9AB24}">
-                  <p16:designElem xmlns:p16="http://schemas.microsoft.com/office/powerpoint/2015/main" val="1"/>
-                </p:ext>
-              </p:extLst>
-            </p:nvPr>
-          </p:nvSpPr>
-          <p:spPr>
-            <a:xfrm>
-              <a:off x="10898730" y="-8467"/>
-              <a:ext cx="1290094" cy="6866467"/>
-            </a:xfrm>
-            <a:custGeom>
-              <a:avLst/>
-              <a:gdLst/>
-              <a:ahLst/>
-              <a:cxnLst/>
-              <a:rect l="l" t="t" r="r" b="b"/>
-              <a:pathLst>
-                <a:path w="1290094" h="6858000">
-                  <a:moveTo>
-                    <a:pt x="1019735" y="0"/>
-                  </a:moveTo>
-                  <a:lnTo>
-                    <a:pt x="1290094" y="0"/>
-                  </a:lnTo>
-                  <a:lnTo>
-                    <a:pt x="1290094" y="6858000"/>
-                  </a:lnTo>
-                  <a:lnTo>
-                    <a:pt x="0" y="6858000"/>
-                  </a:lnTo>
-                  <a:lnTo>
-                    <a:pt x="1019735" y="0"/>
-                  </a:lnTo>
-                  <a:close/>
-                </a:path>
-              </a:pathLst>
-            </a:custGeom>
-            <a:solidFill>
-              <a:schemeClr val="accent1">
-                <a:lumMod val="60000"/>
-                <a:lumOff val="40000"/>
-                <a:alpha val="70000"/>
-              </a:schemeClr>
-            </a:solidFill>
-            <a:ln>
-              <a:noFill/>
-            </a:ln>
-            <a:effectLst/>
-          </p:spPr>
-          <p:style>
-            <a:lnRef idx="1">
-              <a:schemeClr val="accent1"/>
-            </a:lnRef>
-            <a:fillRef idx="3">
-              <a:schemeClr val="accent1"/>
-            </a:fillRef>
-            <a:effectRef idx="2">
-              <a:schemeClr val="accent1"/>
-            </a:effectRef>
-            <a:fontRef idx="minor">
-              <a:schemeClr val="lt1"/>
-            </a:fontRef>
-          </p:style>
-        </p:sp>
-        <p:sp>
-          <p:nvSpPr>
-            <p:cNvPr id="18" name="Rectangle 29">
-              <a:extLst>
-                <a:ext uri="{FF2B5EF4-FFF2-40B4-BE49-F238E27FC236}">
-                  <a16:creationId xmlns:a16="http://schemas.microsoft.com/office/drawing/2014/main" id="{D663A5EE-5581-44F3-8F98-688755F63EA2}"/>
-                </a:ext>
-                <a:ext uri="{C183D7F6-B498-43B3-948B-1728B52AA6E4}">
-                  <adec:decorative xmlns:adec="http://schemas.microsoft.com/office/drawing/2017/decorative" val="1"/>
-                </a:ext>
-              </a:extLst>
-            </p:cNvPr>
-            <p:cNvSpPr/>
-            <p:nvPr>
-              <p:extLst>
-                <p:ext uri="{386F3935-93C4-4BCD-93E2-E3B085C9AB24}">
-                  <p16:designElem xmlns:p16="http://schemas.microsoft.com/office/powerpoint/2015/main" val="1"/>
-                </p:ext>
-              </p:extLst>
-            </p:nvPr>
-          </p:nvSpPr>
-          <p:spPr>
-            <a:xfrm>
-              <a:off x="10938999" y="-8467"/>
-              <a:ext cx="1249825" cy="6866467"/>
-            </a:xfrm>
-            <a:custGeom>
-              <a:avLst/>
-              <a:gdLst/>
-              <a:ahLst/>
-              <a:cxnLst/>
-              <a:rect l="l" t="t" r="r" b="b"/>
-              <a:pathLst>
-                <a:path w="1249825" h="6858000">
-                  <a:moveTo>
-                    <a:pt x="0" y="0"/>
-                  </a:moveTo>
-                  <a:lnTo>
-                    <a:pt x="1249825" y="0"/>
-                  </a:lnTo>
-                  <a:lnTo>
-                    <a:pt x="1249825" y="6858000"/>
-                  </a:lnTo>
-                  <a:lnTo>
-                    <a:pt x="1109382" y="6858000"/>
-                  </a:lnTo>
-                  <a:lnTo>
-                    <a:pt x="0" y="0"/>
-                  </a:lnTo>
-                  <a:close/>
-                </a:path>
-              </a:pathLst>
-            </a:custGeom>
-            <a:solidFill>
-              <a:schemeClr val="accent1">
-                <a:alpha val="65000"/>
-              </a:schemeClr>
-            </a:solidFill>
-            <a:ln>
-              <a:noFill/>
-            </a:ln>
-            <a:effectLst/>
-          </p:spPr>
-          <p:style>
-            <a:lnRef idx="1">
-              <a:schemeClr val="accent1"/>
-            </a:lnRef>
-            <a:fillRef idx="3">
-              <a:schemeClr val="accent1"/>
-            </a:fillRef>
-            <a:effectRef idx="2">
-              <a:schemeClr val="accent1"/>
-            </a:effectRef>
-            <a:fontRef idx="minor">
-              <a:schemeClr val="lt1"/>
-            </a:fontRef>
-          </p:style>
-        </p:sp>
-        <p:sp>
-          <p:nvSpPr>
-            <p:cNvPr id="19" name="Isosceles Triangle 18">
-              <a:extLst>
-                <a:ext uri="{FF2B5EF4-FFF2-40B4-BE49-F238E27FC236}">
-                  <a16:creationId xmlns:a16="http://schemas.microsoft.com/office/drawing/2014/main" id="{B1E84E6A-F5AE-4F4D-98F2-82FE4FCC2656}"/>
-                </a:ext>
-                <a:ext uri="{C183D7F6-B498-43B3-948B-1728B52AA6E4}">
-                  <adec:decorative xmlns:adec="http://schemas.microsoft.com/office/drawing/2017/decorative" val="1"/>
-                </a:ext>
-              </a:extLst>
-            </p:cNvPr>
-            <p:cNvSpPr/>
-            <p:nvPr>
-              <p:extLst>
-                <p:ext uri="{386F3935-93C4-4BCD-93E2-E3B085C9AB24}">
-                  <p16:designElem xmlns:p16="http://schemas.microsoft.com/office/powerpoint/2015/main" val="1"/>
-                </p:ext>
-              </p:extLst>
-            </p:nvPr>
-          </p:nvSpPr>
-          <p:spPr>
-            <a:xfrm>
-              <a:off x="10371666" y="3589867"/>
-              <a:ext cx="1817159" cy="3268133"/>
-            </a:xfrm>
-            <a:prstGeom prst="triangle">
-              <a:avLst>
-                <a:gd name="adj" fmla="val 100000"/>
-              </a:avLst>
-            </a:prstGeom>
-            <a:solidFill>
-              <a:schemeClr val="accent1">
-                <a:alpha val="80000"/>
-              </a:schemeClr>
-            </a:solidFill>
-            <a:ln>
-              <a:noFill/>
-            </a:ln>
-            <a:effectLst/>
-          </p:spPr>
-          <p:style>
-            <a:lnRef idx="1">
-              <a:schemeClr val="accent1"/>
-            </a:lnRef>
-            <a:fillRef idx="3">
-              <a:schemeClr val="accent1"/>
-            </a:fillRef>
-            <a:effectRef idx="2">
-              <a:schemeClr val="accent1"/>
-            </a:effectRef>
-            <a:fontRef idx="minor">
-              <a:schemeClr val="lt1"/>
-            </a:fontRef>
-          </p:style>
-        </p:sp>
-        <p:sp>
-          <p:nvSpPr>
-            <p:cNvPr id="20" name="Isosceles Triangle 19">
-              <a:extLst>
-                <a:ext uri="{FF2B5EF4-FFF2-40B4-BE49-F238E27FC236}">
-                  <a16:creationId xmlns:a16="http://schemas.microsoft.com/office/drawing/2014/main" id="{DDE7DDC9-17D4-4686-833D-48F8733B49EE}"/>
-                </a:ext>
-                <a:ext uri="{C183D7F6-B498-43B3-948B-1728B52AA6E4}">
-                  <adec:decorative xmlns:adec="http://schemas.microsoft.com/office/drawing/2017/decorative" val="1"/>
-                </a:ext>
-              </a:extLst>
-            </p:cNvPr>
-            <p:cNvSpPr/>
-            <p:nvPr>
-              <p:extLst>
-                <p:ext uri="{386F3935-93C4-4BCD-93E2-E3B085C9AB24}">
-                  <p16:designElem xmlns:p16="http://schemas.microsoft.com/office/powerpoint/2015/main" val="1"/>
-                </p:ext>
-              </p:extLst>
-            </p:nvPr>
-          </p:nvSpPr>
-          <p:spPr>
-            <a:xfrm>
-              <a:off x="0" y="4013200"/>
-              <a:ext cx="448733" cy="2844800"/>
-            </a:xfrm>
-            <a:prstGeom prst="triangle">
-              <a:avLst>
-                <a:gd name="adj" fmla="val 0"/>
-              </a:avLst>
-            </a:prstGeom>
-            <a:solidFill>
-              <a:schemeClr val="accent1">
-                <a:alpha val="85000"/>
-              </a:schemeClr>
-            </a:solidFill>
-            <a:ln>
-              <a:noFill/>
-            </a:ln>
-            <a:effectLst/>
-          </p:spPr>
-          <p:style>
-            <a:lnRef idx="1">
-              <a:schemeClr val="accent1"/>
-            </a:lnRef>
-            <a:fillRef idx="3">
-              <a:schemeClr val="accent1"/>
-            </a:fillRef>
-            <a:effectRef idx="2">
-              <a:schemeClr val="accent1"/>
-            </a:effectRef>
-            <a:fontRef idx="minor">
-              <a:schemeClr val="lt1"/>
-            </a:fontRef>
-          </p:style>
-        </p:sp>
-      </p:grpSp>
       <p:sp>
         <p:nvSpPr>
           <p:cNvPr id="3" name="Content Placeholder 2">
@@ -6793,7 +6024,7 @@
             </a:r>
             <a:r>
               <a:rPr lang="sv-SE" sz="2100" dirty="0"/>
-              <a:t>We aim to study number 1), but in case of no sucess we will proceed with 2).</a:t>
+              <a:t>We aim to study number 1), but in case of no success we will proceed with 2).</a:t>
             </a:r>
             <a:endParaRPr lang="sv-SE" sz="2100" b="1" dirty="0"/>
           </a:p>
@@ -6814,7 +6045,7 @@
             </a:r>
             <a:r>
               <a:rPr lang="sv-SE" sz="2400" dirty="0"/>
-              <a:t>: Study country-wise clustering of </a:t>
+              <a:t>: Study clustering of </a:t>
             </a:r>
             <a:r>
               <a:rPr lang="sv-SE" sz="2400" b="1" dirty="0"/>
@@ -6865,7 +6096,7 @@
             </a:pPr>
             <a:r>
               <a:rPr lang="sv-SE" sz="2400" dirty="0"/>
-              <a:t>1). Self-designed Sequential Autoencoder (SAE)</a:t>
+              <a:t>1). Self-designed Sequential Auto Encoder (SAE), PCA &amp; t-SNE</a:t>
             </a:r>
           </a:p>
           <a:p>
@@ -6896,8 +6127,8 @@
         </p:nvSpPr>
         <p:spPr>
           <a:xfrm>
-            <a:off x="448733" y="557524"/>
-            <a:ext cx="6096000" cy="584775"/>
+            <a:off x="-237068" y="343673"/>
+            <a:ext cx="9090922" cy="954107"/>
           </a:xfrm>
           <a:prstGeom prst="rect">
             <a:avLst/>
@@ -6910,19 +6141,31 @@
           </a:bodyPr>
           <a:lstStyle/>
           <a:p>
-            <a:r>
-              <a:rPr lang="sv-SE" sz="3200" dirty="0"/>
-              <a:t>Team BEE – Björn, Emil &amp; Eric</a:t>
-            </a:r>
+            <a:pPr algn="r"/>
+            <a:r>
+              <a:rPr lang="sv-SE" sz="3200"/>
+              <a:t>CovAEd-19 - </a:t>
+            </a:r>
+            <a:r>
+              <a:rPr lang="en-US" sz="2400"/>
+              <a:t>Autoencoders for unsupervised clustering of</a:t>
+            </a:r>
+          </a:p>
+          <a:p>
+            <a:r>
+              <a:rPr lang="en-US" sz="2400"/>
+              <a:t>                               unaligned genome sequences</a:t>
+            </a:r>
+            <a:endParaRPr lang="sv-SE" sz="3200" dirty="0"/>
           </a:p>
         </p:txBody>
       </p:sp>
       <p:pic>
         <p:nvPicPr>
-          <p:cNvPr id="5" name="Picture 4" descr="A close up of a logo&#10;&#10;Description automatically generated">
+          <p:cNvPr id="6" name="Picture 5" descr="A screenshot of a cell phone&#10;&#10;Description automatically generated">
             <a:extLst>
               <a:ext uri="{FF2B5EF4-FFF2-40B4-BE49-F238E27FC236}">
-                <a16:creationId xmlns:a16="http://schemas.microsoft.com/office/drawing/2014/main" id="{D2BB2364-CDC2-4969-B854-361F233A9CD5}"/>
+                <a16:creationId xmlns:a16="http://schemas.microsoft.com/office/drawing/2014/main" id="{96DB636A-0B11-4D23-8EF0-0CD36D0F03A1}"/>
               </a:ext>
             </a:extLst>
           </p:cNvPr>
@@ -6945,8 +6188,8 @@
         </p:blipFill>
         <p:spPr>
           <a:xfrm>
-            <a:off x="6175463" y="711279"/>
-            <a:ext cx="297600" cy="277264"/>
+            <a:off x="7043137" y="4618948"/>
+            <a:ext cx="4504462" cy="2098549"/>
           </a:xfrm>
           <a:prstGeom prst="rect">
             <a:avLst/>
@@ -7217,7 +6460,7 @@
   <a:extraClrSchemeLst/>
   <a:extLst>
     <a:ext uri="{05A4C25C-085E-4340-85A3-A5531E510DB2}">
-      <thm15:themeFamily xmlns:thm15="http://schemas.microsoft.com/office/thememl/2012/main" name="Facet" id="{C0C680CD-088A-49FC-A102-D699147F32B2}" vid="{CFBC31BA-B70F-4F30-BCAA-4F3011E16C4D}"/>
+      <thm15:themeFamily xmlns:thm15="http://schemas.microsoft.com/office/thememl/2012/main" name="Facet" id="{C0C680CD-088A-49FC-A102-D699147F32B2}" vid="{8C59B386-999D-4CB6-B907-9F3997C027CC}"/>
     </a:ext>
   </a:extLst>
 </a:theme>

</xml_diff>